<commit_message>
small fixes to syntax
</commit_message>
<xml_diff>
--- a/slides/01-ReviewOfProofs.pptx
+++ b/slides/01-ReviewOfProofs.pptx
@@ -643,7 +643,7 @@
           <a:noFill/>
           <a:extLst>
             <a:ext uri="{909E8E84-426E-40dd-AFC4-6F175D3DCCD1}">
-              <a14:hiddenFill xmlns:a14="http://schemas.microsoft.com/office/drawing/2010/main" xmlns="">
+              <a14:hiddenFill xmlns="" xmlns:a14="http://schemas.microsoft.com/office/drawing/2010/main">
                 <a:solidFill>
                   <a:srgbClr val="FFFFFF"/>
                 </a:solidFill>
@@ -702,7 +702,7 @@
             </a:ln>
             <a:extLst>
               <a:ext uri="{91240B29-F687-4f45-9708-019B960494DF}">
-                <a14:hiddenLine xmlns:a14="http://schemas.microsoft.com/office/drawing/2010/main" xmlns="" w="9525">
+                <a14:hiddenLine xmlns="" xmlns:a14="http://schemas.microsoft.com/office/drawing/2010/main" w="9525">
                   <a:solidFill>
                     <a:srgbClr val="000000"/>
                   </a:solidFill>
@@ -792,7 +792,7 @@
             </a:ln>
             <a:extLst>
               <a:ext uri="{91240B29-F687-4f45-9708-019B960494DF}">
-                <a14:hiddenLine xmlns:a14="http://schemas.microsoft.com/office/drawing/2010/main" xmlns="" w="9525">
+                <a14:hiddenLine xmlns="" xmlns:a14="http://schemas.microsoft.com/office/drawing/2010/main" w="9525">
                   <a:solidFill>
                     <a:srgbClr val="000000"/>
                   </a:solidFill>
@@ -882,7 +882,7 @@
             </a:ln>
             <a:extLst>
               <a:ext uri="{91240B29-F687-4f45-9708-019B960494DF}">
-                <a14:hiddenLine xmlns:a14="http://schemas.microsoft.com/office/drawing/2010/main" xmlns="" w="9525">
+                <a14:hiddenLine xmlns="" xmlns:a14="http://schemas.microsoft.com/office/drawing/2010/main" w="9525">
                   <a:solidFill>
                     <a:srgbClr val="000000"/>
                   </a:solidFill>
@@ -916,7 +916,7 @@
             </a:ln>
             <a:extLst>
               <a:ext uri="{91240B29-F687-4f45-9708-019B960494DF}">
-                <a14:hiddenLine xmlns:a14="http://schemas.microsoft.com/office/drawing/2010/main" xmlns="" w="9525">
+                <a14:hiddenLine xmlns="" xmlns:a14="http://schemas.microsoft.com/office/drawing/2010/main" w="9525">
                   <a:solidFill>
                     <a:srgbClr val="000000"/>
                   </a:solidFill>
@@ -1006,7 +1006,7 @@
             </a:ln>
             <a:extLst>
               <a:ext uri="{91240B29-F687-4f45-9708-019B960494DF}">
-                <a14:hiddenLine xmlns:a14="http://schemas.microsoft.com/office/drawing/2010/main" xmlns="" w="9525">
+                <a14:hiddenLine xmlns="" xmlns:a14="http://schemas.microsoft.com/office/drawing/2010/main" w="9525">
                   <a:solidFill>
                     <a:srgbClr val="000000"/>
                   </a:solidFill>
@@ -1068,7 +1068,7 @@
             </a:ln>
             <a:extLst>
               <a:ext uri="{91240B29-F687-4f45-9708-019B960494DF}">
-                <a14:hiddenLine xmlns:a14="http://schemas.microsoft.com/office/drawing/2010/main" xmlns="" w="9525">
+                <a14:hiddenLine xmlns="" xmlns:a14="http://schemas.microsoft.com/office/drawing/2010/main" w="9525">
                   <a:solidFill>
                     <a:srgbClr val="000000"/>
                   </a:solidFill>
@@ -1130,7 +1130,7 @@
             </a:ln>
             <a:extLst>
               <a:ext uri="{91240B29-F687-4f45-9708-019B960494DF}">
-                <a14:hiddenLine xmlns:a14="http://schemas.microsoft.com/office/drawing/2010/main" xmlns="" w="9525">
+                <a14:hiddenLine xmlns="" xmlns:a14="http://schemas.microsoft.com/office/drawing/2010/main" w="9525">
                   <a:solidFill>
                     <a:srgbClr val="000000"/>
                   </a:solidFill>
@@ -1220,7 +1220,7 @@
             </a:ln>
             <a:extLst>
               <a:ext uri="{91240B29-F687-4f45-9708-019B960494DF}">
-                <a14:hiddenLine xmlns:a14="http://schemas.microsoft.com/office/drawing/2010/main" xmlns="" w="9525">
+                <a14:hiddenLine xmlns="" xmlns:a14="http://schemas.microsoft.com/office/drawing/2010/main" w="9525">
                   <a:solidFill>
                     <a:srgbClr val="000000"/>
                   </a:solidFill>
@@ -1282,7 +1282,7 @@
             </a:ln>
             <a:extLst>
               <a:ext uri="{91240B29-F687-4f45-9708-019B960494DF}">
-                <a14:hiddenLine xmlns:a14="http://schemas.microsoft.com/office/drawing/2010/main" xmlns="" w="9525">
+                <a14:hiddenLine xmlns="" xmlns:a14="http://schemas.microsoft.com/office/drawing/2010/main" w="9525">
                   <a:solidFill>
                     <a:srgbClr val="000000"/>
                   </a:solidFill>
@@ -1344,7 +1344,7 @@
             </a:ln>
             <a:extLst>
               <a:ext uri="{91240B29-F687-4f45-9708-019B960494DF}">
-                <a14:hiddenLine xmlns:a14="http://schemas.microsoft.com/office/drawing/2010/main" xmlns="" w="9525">
+                <a14:hiddenLine xmlns="" xmlns:a14="http://schemas.microsoft.com/office/drawing/2010/main" w="9525">
                   <a:solidFill>
                     <a:srgbClr val="000000"/>
                   </a:solidFill>
@@ -1434,7 +1434,7 @@
             </a:ln>
             <a:extLst>
               <a:ext uri="{91240B29-F687-4f45-9708-019B960494DF}">
-                <a14:hiddenLine xmlns:a14="http://schemas.microsoft.com/office/drawing/2010/main" xmlns="" w="9525">
+                <a14:hiddenLine xmlns="" xmlns:a14="http://schemas.microsoft.com/office/drawing/2010/main" w="9525">
                   <a:solidFill>
                     <a:srgbClr val="000000"/>
                   </a:solidFill>
@@ -1524,7 +1524,7 @@
             </a:ln>
             <a:extLst>
               <a:ext uri="{91240B29-F687-4f45-9708-019B960494DF}">
-                <a14:hiddenLine xmlns:a14="http://schemas.microsoft.com/office/drawing/2010/main" xmlns="" w="9525">
+                <a14:hiddenLine xmlns="" xmlns:a14="http://schemas.microsoft.com/office/drawing/2010/main" w="9525">
                   <a:solidFill>
                     <a:srgbClr val="000000"/>
                   </a:solidFill>
@@ -1586,7 +1586,7 @@
             </a:ln>
             <a:extLst>
               <a:ext uri="{91240B29-F687-4f45-9708-019B960494DF}">
-                <a14:hiddenLine xmlns:a14="http://schemas.microsoft.com/office/drawing/2010/main" xmlns="" w="9525">
+                <a14:hiddenLine xmlns="" xmlns:a14="http://schemas.microsoft.com/office/drawing/2010/main" w="9525">
                   <a:solidFill>
                     <a:srgbClr val="000000"/>
                   </a:solidFill>
@@ -1696,7 +1696,7 @@
             </a:ln>
             <a:extLst>
               <a:ext uri="{91240B29-F687-4f45-9708-019B960494DF}">
-                <a14:hiddenLine xmlns:a14="http://schemas.microsoft.com/office/drawing/2010/main" xmlns="" w="9525">
+                <a14:hiddenLine xmlns="" xmlns:a14="http://schemas.microsoft.com/office/drawing/2010/main" w="9525">
                   <a:solidFill>
                     <a:srgbClr val="000000"/>
                   </a:solidFill>
@@ -1758,7 +1758,7 @@
             </a:ln>
             <a:extLst>
               <a:ext uri="{91240B29-F687-4f45-9708-019B960494DF}">
-                <a14:hiddenLine xmlns:a14="http://schemas.microsoft.com/office/drawing/2010/main" xmlns="" w="9525">
+                <a14:hiddenLine xmlns="" xmlns:a14="http://schemas.microsoft.com/office/drawing/2010/main" w="9525">
                   <a:solidFill>
                     <a:srgbClr val="000000"/>
                   </a:solidFill>
@@ -1848,7 +1848,7 @@
             </a:ln>
             <a:extLst>
               <a:ext uri="{91240B29-F687-4f45-9708-019B960494DF}">
-                <a14:hiddenLine xmlns:a14="http://schemas.microsoft.com/office/drawing/2010/main" xmlns="" w="9525">
+                <a14:hiddenLine xmlns="" xmlns:a14="http://schemas.microsoft.com/office/drawing/2010/main" w="9525">
                   <a:solidFill>
                     <a:srgbClr val="000000"/>
                   </a:solidFill>
@@ -1938,7 +1938,7 @@
             </a:ln>
             <a:extLst>
               <a:ext uri="{91240B29-F687-4f45-9708-019B960494DF}">
-                <a14:hiddenLine xmlns:a14="http://schemas.microsoft.com/office/drawing/2010/main" xmlns="" w="9525">
+                <a14:hiddenLine xmlns="" xmlns:a14="http://schemas.microsoft.com/office/drawing/2010/main" w="9525">
                   <a:solidFill>
                     <a:srgbClr val="000000"/>
                   </a:solidFill>
@@ -2000,7 +2000,7 @@
             </a:ln>
             <a:extLst>
               <a:ext uri="{91240B29-F687-4f45-9708-019B960494DF}">
-                <a14:hiddenLine xmlns:a14="http://schemas.microsoft.com/office/drawing/2010/main" xmlns="" w="9525">
+                <a14:hiddenLine xmlns="" xmlns:a14="http://schemas.microsoft.com/office/drawing/2010/main" w="9525">
                   <a:solidFill>
                     <a:srgbClr val="000000"/>
                   </a:solidFill>
@@ -2090,7 +2090,7 @@
             </a:ln>
             <a:extLst>
               <a:ext uri="{91240B29-F687-4f45-9708-019B960494DF}">
-                <a14:hiddenLine xmlns:a14="http://schemas.microsoft.com/office/drawing/2010/main" xmlns="" w="9525">
+                <a14:hiddenLine xmlns="" xmlns:a14="http://schemas.microsoft.com/office/drawing/2010/main" w="9525">
                   <a:solidFill>
                     <a:srgbClr val="000000"/>
                   </a:solidFill>
@@ -2180,7 +2180,7 @@
             </a:ln>
             <a:extLst>
               <a:ext uri="{91240B29-F687-4f45-9708-019B960494DF}">
-                <a14:hiddenLine xmlns:a14="http://schemas.microsoft.com/office/drawing/2010/main" xmlns="" w="9525">
+                <a14:hiddenLine xmlns="" xmlns:a14="http://schemas.microsoft.com/office/drawing/2010/main" w="9525">
                   <a:solidFill>
                     <a:srgbClr val="000000"/>
                   </a:solidFill>
@@ -2236,7 +2236,7 @@
             </a:ln>
             <a:extLst>
               <a:ext uri="{91240B29-F687-4f45-9708-019B960494DF}">
-                <a14:hiddenLine xmlns:a14="http://schemas.microsoft.com/office/drawing/2010/main" xmlns="" w="9525">
+                <a14:hiddenLine xmlns="" xmlns:a14="http://schemas.microsoft.com/office/drawing/2010/main" w="9525">
                   <a:solidFill>
                     <a:srgbClr val="000000"/>
                   </a:solidFill>
@@ -2326,7 +2326,7 @@
             </a:ln>
             <a:extLst>
               <a:ext uri="{91240B29-F687-4f45-9708-019B960494DF}">
-                <a14:hiddenLine xmlns:a14="http://schemas.microsoft.com/office/drawing/2010/main" xmlns="" w="9525">
+                <a14:hiddenLine xmlns="" xmlns:a14="http://schemas.microsoft.com/office/drawing/2010/main" w="9525">
                   <a:solidFill>
                     <a:srgbClr val="000000"/>
                   </a:solidFill>
@@ -2382,7 +2382,7 @@
             </a:ln>
             <a:extLst>
               <a:ext uri="{91240B29-F687-4f45-9708-019B960494DF}">
-                <a14:hiddenLine xmlns:a14="http://schemas.microsoft.com/office/drawing/2010/main" xmlns="" w="9525">
+                <a14:hiddenLine xmlns="" xmlns:a14="http://schemas.microsoft.com/office/drawing/2010/main" w="9525">
                   <a:solidFill>
                     <a:srgbClr val="000000"/>
                   </a:solidFill>
@@ -2472,7 +2472,7 @@
             </a:ln>
             <a:extLst>
               <a:ext uri="{91240B29-F687-4f45-9708-019B960494DF}">
-                <a14:hiddenLine xmlns:a14="http://schemas.microsoft.com/office/drawing/2010/main" xmlns="" w="9525">
+                <a14:hiddenLine xmlns="" xmlns:a14="http://schemas.microsoft.com/office/drawing/2010/main" w="9525">
                   <a:solidFill>
                     <a:srgbClr val="000000"/>
                   </a:solidFill>
@@ -2540,7 +2540,7 @@
             </a:ln>
             <a:extLst>
               <a:ext uri="{91240B29-F687-4f45-9708-019B960494DF}">
-                <a14:hiddenLine xmlns:a14="http://schemas.microsoft.com/office/drawing/2010/main" xmlns="" w="9525">
+                <a14:hiddenLine xmlns="" xmlns:a14="http://schemas.microsoft.com/office/drawing/2010/main" w="9525">
                   <a:solidFill>
                     <a:srgbClr val="000000"/>
                   </a:solidFill>
@@ -2630,7 +2630,7 @@
             </a:ln>
             <a:extLst>
               <a:ext uri="{91240B29-F687-4f45-9708-019B960494DF}">
-                <a14:hiddenLine xmlns:a14="http://schemas.microsoft.com/office/drawing/2010/main" xmlns="" w="9525">
+                <a14:hiddenLine xmlns="" xmlns:a14="http://schemas.microsoft.com/office/drawing/2010/main" w="9525">
                   <a:solidFill>
                     <a:srgbClr val="000000"/>
                   </a:solidFill>
@@ -2698,7 +2698,7 @@
             </a:ln>
             <a:extLst>
               <a:ext uri="{91240B29-F687-4f45-9708-019B960494DF}">
-                <a14:hiddenLine xmlns:a14="http://schemas.microsoft.com/office/drawing/2010/main" xmlns="" w="9525">
+                <a14:hiddenLine xmlns="" xmlns:a14="http://schemas.microsoft.com/office/drawing/2010/main" w="9525">
                   <a:solidFill>
                     <a:srgbClr val="000000"/>
                   </a:solidFill>
@@ -2788,7 +2788,7 @@
             </a:ln>
             <a:extLst>
               <a:ext uri="{91240B29-F687-4f45-9708-019B960494DF}">
-                <a14:hiddenLine xmlns:a14="http://schemas.microsoft.com/office/drawing/2010/main" xmlns="" w="9525">
+                <a14:hiddenLine xmlns="" xmlns:a14="http://schemas.microsoft.com/office/drawing/2010/main" w="9525">
                   <a:solidFill>
                     <a:srgbClr val="000000"/>
                   </a:solidFill>
@@ -2822,7 +2822,7 @@
             </a:ln>
             <a:extLst>
               <a:ext uri="{91240B29-F687-4f45-9708-019B960494DF}">
-                <a14:hiddenLine xmlns:a14="http://schemas.microsoft.com/office/drawing/2010/main" xmlns="" w="9525">
+                <a14:hiddenLine xmlns="" xmlns:a14="http://schemas.microsoft.com/office/drawing/2010/main" w="9525">
                   <a:solidFill>
                     <a:srgbClr val="000000"/>
                   </a:solidFill>
@@ -2912,7 +2912,7 @@
             </a:ln>
             <a:extLst>
               <a:ext uri="{91240B29-F687-4f45-9708-019B960494DF}">
-                <a14:hiddenLine xmlns:a14="http://schemas.microsoft.com/office/drawing/2010/main" xmlns="" w="9525">
+                <a14:hiddenLine xmlns="" xmlns:a14="http://schemas.microsoft.com/office/drawing/2010/main" w="9525">
                   <a:solidFill>
                     <a:srgbClr val="000000"/>
                   </a:solidFill>
@@ -2974,7 +2974,7 @@
             </a:ln>
             <a:extLst>
               <a:ext uri="{91240B29-F687-4f45-9708-019B960494DF}">
-                <a14:hiddenLine xmlns:a14="http://schemas.microsoft.com/office/drawing/2010/main" xmlns="" w="9525">
+                <a14:hiddenLine xmlns="" xmlns:a14="http://schemas.microsoft.com/office/drawing/2010/main" w="9525">
                   <a:solidFill>
                     <a:srgbClr val="000000"/>
                   </a:solidFill>
@@ -3036,7 +3036,7 @@
             </a:ln>
             <a:extLst>
               <a:ext uri="{91240B29-F687-4f45-9708-019B960494DF}">
-                <a14:hiddenLine xmlns:a14="http://schemas.microsoft.com/office/drawing/2010/main" xmlns="" w="9525">
+                <a14:hiddenLine xmlns="" xmlns:a14="http://schemas.microsoft.com/office/drawing/2010/main" w="9525">
                   <a:solidFill>
                     <a:srgbClr val="000000"/>
                   </a:solidFill>
@@ -3126,7 +3126,7 @@
             </a:ln>
             <a:extLst>
               <a:ext uri="{91240B29-F687-4f45-9708-019B960494DF}">
-                <a14:hiddenLine xmlns:a14="http://schemas.microsoft.com/office/drawing/2010/main" xmlns="" w="9525">
+                <a14:hiddenLine xmlns="" xmlns:a14="http://schemas.microsoft.com/office/drawing/2010/main" w="9525">
                   <a:solidFill>
                     <a:srgbClr val="000000"/>
                   </a:solidFill>
@@ -3194,7 +3194,7 @@
             </a:ln>
             <a:extLst>
               <a:ext uri="{91240B29-F687-4f45-9708-019B960494DF}">
-                <a14:hiddenLine xmlns:a14="http://schemas.microsoft.com/office/drawing/2010/main" xmlns="" w="9525">
+                <a14:hiddenLine xmlns="" xmlns:a14="http://schemas.microsoft.com/office/drawing/2010/main" w="9525">
                   <a:solidFill>
                     <a:srgbClr val="000000"/>
                   </a:solidFill>
@@ -3256,7 +3256,7 @@
             </a:ln>
             <a:extLst>
               <a:ext uri="{91240B29-F687-4f45-9708-019B960494DF}">
-                <a14:hiddenLine xmlns:a14="http://schemas.microsoft.com/office/drawing/2010/main" xmlns="" w="9525">
+                <a14:hiddenLine xmlns="" xmlns:a14="http://schemas.microsoft.com/office/drawing/2010/main" w="9525">
                   <a:solidFill>
                     <a:srgbClr val="000000"/>
                   </a:solidFill>
@@ -3346,7 +3346,7 @@
             </a:ln>
             <a:extLst>
               <a:ext uri="{91240B29-F687-4f45-9708-019B960494DF}">
-                <a14:hiddenLine xmlns:a14="http://schemas.microsoft.com/office/drawing/2010/main" xmlns="" w="9525">
+                <a14:hiddenLine xmlns="" xmlns:a14="http://schemas.microsoft.com/office/drawing/2010/main" w="9525">
                   <a:solidFill>
                     <a:srgbClr val="000000"/>
                   </a:solidFill>
@@ -3408,7 +3408,7 @@
             </a:ln>
             <a:extLst>
               <a:ext uri="{91240B29-F687-4f45-9708-019B960494DF}">
-                <a14:hiddenLine xmlns:a14="http://schemas.microsoft.com/office/drawing/2010/main" xmlns="" w="9525">
+                <a14:hiddenLine xmlns="" xmlns:a14="http://schemas.microsoft.com/office/drawing/2010/main" w="9525">
                   <a:solidFill>
                     <a:srgbClr val="000000"/>
                   </a:solidFill>
@@ -3498,7 +3498,7 @@
             </a:ln>
             <a:extLst>
               <a:ext uri="{91240B29-F687-4f45-9708-019B960494DF}">
-                <a14:hiddenLine xmlns:a14="http://schemas.microsoft.com/office/drawing/2010/main" xmlns="" w="9525">
+                <a14:hiddenLine xmlns="" xmlns:a14="http://schemas.microsoft.com/office/drawing/2010/main" w="9525">
                   <a:solidFill>
                     <a:srgbClr val="000000"/>
                   </a:solidFill>
@@ -3560,7 +3560,7 @@
             </a:ln>
             <a:extLst>
               <a:ext uri="{91240B29-F687-4f45-9708-019B960494DF}">
-                <a14:hiddenLine xmlns:a14="http://schemas.microsoft.com/office/drawing/2010/main" xmlns="" w="9525">
+                <a14:hiddenLine xmlns="" xmlns:a14="http://schemas.microsoft.com/office/drawing/2010/main" w="9525">
                   <a:solidFill>
                     <a:srgbClr val="000000"/>
                   </a:solidFill>
@@ -3650,7 +3650,7 @@
             </a:ln>
             <a:extLst>
               <a:ext uri="{91240B29-F687-4f45-9708-019B960494DF}">
-                <a14:hiddenLine xmlns:a14="http://schemas.microsoft.com/office/drawing/2010/main" xmlns="" w="9525">
+                <a14:hiddenLine xmlns="" xmlns:a14="http://schemas.microsoft.com/office/drawing/2010/main" w="9525">
                   <a:solidFill>
                     <a:srgbClr val="000000"/>
                   </a:solidFill>
@@ -3684,7 +3684,7 @@
             </a:ln>
             <a:extLst>
               <a:ext uri="{91240B29-F687-4f45-9708-019B960494DF}">
-                <a14:hiddenLine xmlns:a14="http://schemas.microsoft.com/office/drawing/2010/main" xmlns="" w="9525">
+                <a14:hiddenLine xmlns="" xmlns:a14="http://schemas.microsoft.com/office/drawing/2010/main" w="9525">
                   <a:solidFill>
                     <a:srgbClr val="000000"/>
                   </a:solidFill>
@@ -3749,7 +3749,7 @@
             </a:ln>
             <a:extLst>
               <a:ext uri="{91240B29-F687-4f45-9708-019B960494DF}">
-                <a14:hiddenLine xmlns:a14="http://schemas.microsoft.com/office/drawing/2010/main" xmlns="" w="9525">
+                <a14:hiddenLine xmlns="" xmlns:a14="http://schemas.microsoft.com/office/drawing/2010/main" w="9525">
                   <a:solidFill>
                     <a:srgbClr val="000000"/>
                   </a:solidFill>
@@ -3839,7 +3839,7 @@
             </a:ln>
             <a:extLst>
               <a:ext uri="{91240B29-F687-4f45-9708-019B960494DF}">
-                <a14:hiddenLine xmlns:a14="http://schemas.microsoft.com/office/drawing/2010/main" xmlns="" w="9525">
+                <a14:hiddenLine xmlns="" xmlns:a14="http://schemas.microsoft.com/office/drawing/2010/main" w="9525">
                   <a:solidFill>
                     <a:srgbClr val="000000"/>
                   </a:solidFill>
@@ -3901,7 +3901,7 @@
             </a:ln>
             <a:extLst>
               <a:ext uri="{91240B29-F687-4f45-9708-019B960494DF}">
-                <a14:hiddenLine xmlns:a14="http://schemas.microsoft.com/office/drawing/2010/main" xmlns="" w="9525">
+                <a14:hiddenLine xmlns="" xmlns:a14="http://schemas.microsoft.com/office/drawing/2010/main" w="9525">
                   <a:solidFill>
                     <a:srgbClr val="000000"/>
                   </a:solidFill>
@@ -3991,7 +3991,7 @@
             </a:ln>
             <a:extLst>
               <a:ext uri="{91240B29-F687-4f45-9708-019B960494DF}">
-                <a14:hiddenLine xmlns:a14="http://schemas.microsoft.com/office/drawing/2010/main" xmlns="" w="9525">
+                <a14:hiddenLine xmlns="" xmlns:a14="http://schemas.microsoft.com/office/drawing/2010/main" w="9525">
                   <a:solidFill>
                     <a:srgbClr val="000000"/>
                   </a:solidFill>
@@ -4081,7 +4081,7 @@
             </a:ln>
             <a:extLst>
               <a:ext uri="{91240B29-F687-4f45-9708-019B960494DF}">
-                <a14:hiddenLine xmlns:a14="http://schemas.microsoft.com/office/drawing/2010/main" xmlns="" w="9525">
+                <a14:hiddenLine xmlns="" xmlns:a14="http://schemas.microsoft.com/office/drawing/2010/main" w="9525">
                   <a:solidFill>
                     <a:srgbClr val="000000"/>
                   </a:solidFill>
@@ -4146,7 +4146,7 @@
             </a:ln>
             <a:extLst>
               <a:ext uri="{91240B29-F687-4f45-9708-019B960494DF}">
-                <a14:hiddenLine xmlns:a14="http://schemas.microsoft.com/office/drawing/2010/main" xmlns="" w="9525">
+                <a14:hiddenLine xmlns="" xmlns:a14="http://schemas.microsoft.com/office/drawing/2010/main" w="9525">
                   <a:solidFill>
                     <a:srgbClr val="000000"/>
                   </a:solidFill>
@@ -4208,7 +4208,7 @@
             </a:ln>
             <a:extLst>
               <a:ext uri="{91240B29-F687-4f45-9708-019B960494DF}">
-                <a14:hiddenLine xmlns:a14="http://schemas.microsoft.com/office/drawing/2010/main" xmlns="" w="9525">
+                <a14:hiddenLine xmlns="" xmlns:a14="http://schemas.microsoft.com/office/drawing/2010/main" w="9525">
                   <a:solidFill>
                     <a:srgbClr val="000000"/>
                   </a:solidFill>
@@ -4298,7 +4298,7 @@
             </a:ln>
             <a:extLst>
               <a:ext uri="{91240B29-F687-4f45-9708-019B960494DF}">
-                <a14:hiddenLine xmlns:a14="http://schemas.microsoft.com/office/drawing/2010/main" xmlns="" w="9525">
+                <a14:hiddenLine xmlns="" xmlns:a14="http://schemas.microsoft.com/office/drawing/2010/main" w="9525">
                   <a:solidFill>
                     <a:srgbClr val="000000"/>
                   </a:solidFill>
@@ -4388,7 +4388,7 @@
             </a:ln>
             <a:extLst>
               <a:ext uri="{91240B29-F687-4f45-9708-019B960494DF}">
-                <a14:hiddenLine xmlns:a14="http://schemas.microsoft.com/office/drawing/2010/main" xmlns="" w="9525">
+                <a14:hiddenLine xmlns="" xmlns:a14="http://schemas.microsoft.com/office/drawing/2010/main" w="9525">
                   <a:solidFill>
                     <a:srgbClr val="000000"/>
                   </a:solidFill>
@@ -4450,7 +4450,7 @@
             </a:ln>
             <a:extLst>
               <a:ext uri="{91240B29-F687-4f45-9708-019B960494DF}">
-                <a14:hiddenLine xmlns:a14="http://schemas.microsoft.com/office/drawing/2010/main" xmlns="" w="9525">
+                <a14:hiddenLine xmlns="" xmlns:a14="http://schemas.microsoft.com/office/drawing/2010/main" w="9525">
                   <a:solidFill>
                     <a:srgbClr val="000000"/>
                   </a:solidFill>
@@ -4570,7 +4570,7 @@
             </a:ln>
             <a:extLst>
               <a:ext uri="{91240B29-F687-4f45-9708-019B960494DF}">
-                <a14:hiddenLine xmlns:a14="http://schemas.microsoft.com/office/drawing/2010/main" xmlns="" w="9525">
+                <a14:hiddenLine xmlns="" xmlns:a14="http://schemas.microsoft.com/office/drawing/2010/main" w="9525">
                   <a:solidFill>
                     <a:srgbClr val="000000"/>
                   </a:solidFill>
@@ -4638,7 +4638,7 @@
             </a:ln>
             <a:extLst>
               <a:ext uri="{91240B29-F687-4f45-9708-019B960494DF}">
-                <a14:hiddenLine xmlns:a14="http://schemas.microsoft.com/office/drawing/2010/main" xmlns="" w="9525">
+                <a14:hiddenLine xmlns="" xmlns:a14="http://schemas.microsoft.com/office/drawing/2010/main" w="9525">
                   <a:solidFill>
                     <a:srgbClr val="000000"/>
                   </a:solidFill>
@@ -4728,7 +4728,7 @@
             </a:ln>
             <a:extLst>
               <a:ext uri="{91240B29-F687-4f45-9708-019B960494DF}">
-                <a14:hiddenLine xmlns:a14="http://schemas.microsoft.com/office/drawing/2010/main" xmlns="" w="9525">
+                <a14:hiddenLine xmlns="" xmlns:a14="http://schemas.microsoft.com/office/drawing/2010/main" w="9525">
                   <a:solidFill>
                     <a:srgbClr val="000000"/>
                   </a:solidFill>
@@ -9557,7 +9557,7 @@
           <a:noFill/>
           <a:extLst>
             <a:ext uri="{909E8E84-426E-40dd-AFC4-6F175D3DCCD1}">
-              <a14:hiddenFill xmlns:a14="http://schemas.microsoft.com/office/drawing/2010/main" xmlns="">
+              <a14:hiddenFill xmlns="" xmlns:a14="http://schemas.microsoft.com/office/drawing/2010/main">
                 <a:solidFill>
                   <a:srgbClr val="FFFFFF"/>
                 </a:solidFill>
@@ -9631,7 +9631,7 @@
               </a:ln>
               <a:extLst>
                 <a:ext uri="{91240B29-F687-4f45-9708-019B960494DF}">
-                  <a14:hiddenLine xmlns:a14="http://schemas.microsoft.com/office/drawing/2010/main" xmlns="" w="9525">
+                  <a14:hiddenLine xmlns="" xmlns:a14="http://schemas.microsoft.com/office/drawing/2010/main" w="9525">
                     <a:solidFill>
                       <a:srgbClr val="000000"/>
                     </a:solidFill>
@@ -9721,7 +9721,7 @@
               </a:ln>
               <a:extLst>
                 <a:ext uri="{91240B29-F687-4f45-9708-019B960494DF}">
-                  <a14:hiddenLine xmlns:a14="http://schemas.microsoft.com/office/drawing/2010/main" xmlns="" w="9525">
+                  <a14:hiddenLine xmlns="" xmlns:a14="http://schemas.microsoft.com/office/drawing/2010/main" w="9525">
                     <a:solidFill>
                       <a:srgbClr val="000000"/>
                     </a:solidFill>
@@ -9811,7 +9811,7 @@
               </a:ln>
               <a:extLst>
                 <a:ext uri="{91240B29-F687-4f45-9708-019B960494DF}">
-                  <a14:hiddenLine xmlns:a14="http://schemas.microsoft.com/office/drawing/2010/main" xmlns="" w="9525">
+                  <a14:hiddenLine xmlns="" xmlns:a14="http://schemas.microsoft.com/office/drawing/2010/main" w="9525">
                     <a:solidFill>
                       <a:srgbClr val="000000"/>
                     </a:solidFill>
@@ -9873,7 +9873,7 @@
               </a:ln>
               <a:extLst>
                 <a:ext uri="{91240B29-F687-4f45-9708-019B960494DF}">
-                  <a14:hiddenLine xmlns:a14="http://schemas.microsoft.com/office/drawing/2010/main" xmlns="" w="9525">
+                  <a14:hiddenLine xmlns="" xmlns:a14="http://schemas.microsoft.com/office/drawing/2010/main" w="9525">
                     <a:solidFill>
                       <a:srgbClr val="000000"/>
                     </a:solidFill>
@@ -9963,7 +9963,7 @@
               </a:ln>
               <a:extLst>
                 <a:ext uri="{91240B29-F687-4f45-9708-019B960494DF}">
-                  <a14:hiddenLine xmlns:a14="http://schemas.microsoft.com/office/drawing/2010/main" xmlns="" w="9525">
+                  <a14:hiddenLine xmlns="" xmlns:a14="http://schemas.microsoft.com/office/drawing/2010/main" w="9525">
                     <a:solidFill>
                       <a:srgbClr val="000000"/>
                     </a:solidFill>
@@ -10025,7 +10025,7 @@
               </a:ln>
               <a:extLst>
                 <a:ext uri="{91240B29-F687-4f45-9708-019B960494DF}">
-                  <a14:hiddenLine xmlns:a14="http://schemas.microsoft.com/office/drawing/2010/main" xmlns="" w="9525">
+                  <a14:hiddenLine xmlns="" xmlns:a14="http://schemas.microsoft.com/office/drawing/2010/main" w="9525">
                     <a:solidFill>
                       <a:srgbClr val="000000"/>
                     </a:solidFill>
@@ -10087,7 +10087,7 @@
               </a:ln>
               <a:extLst>
                 <a:ext uri="{91240B29-F687-4f45-9708-019B960494DF}">
-                  <a14:hiddenLine xmlns:a14="http://schemas.microsoft.com/office/drawing/2010/main" xmlns="" w="9525">
+                  <a14:hiddenLine xmlns="" xmlns:a14="http://schemas.microsoft.com/office/drawing/2010/main" w="9525">
                     <a:solidFill>
                       <a:srgbClr val="000000"/>
                     </a:solidFill>
@@ -10177,7 +10177,7 @@
               </a:ln>
               <a:extLst>
                 <a:ext uri="{91240B29-F687-4f45-9708-019B960494DF}">
-                  <a14:hiddenLine xmlns:a14="http://schemas.microsoft.com/office/drawing/2010/main" xmlns="" w="9525">
+                  <a14:hiddenLine xmlns="" xmlns:a14="http://schemas.microsoft.com/office/drawing/2010/main" w="9525">
                     <a:solidFill>
                       <a:srgbClr val="000000"/>
                     </a:solidFill>
@@ -10267,7 +10267,7 @@
               </a:ln>
               <a:extLst>
                 <a:ext uri="{91240B29-F687-4f45-9708-019B960494DF}">
-                  <a14:hiddenLine xmlns:a14="http://schemas.microsoft.com/office/drawing/2010/main" xmlns="" w="9525">
+                  <a14:hiddenLine xmlns="" xmlns:a14="http://schemas.microsoft.com/office/drawing/2010/main" w="9525">
                     <a:solidFill>
                       <a:srgbClr val="000000"/>
                     </a:solidFill>
@@ -10329,7 +10329,7 @@
               </a:ln>
               <a:extLst>
                 <a:ext uri="{91240B29-F687-4f45-9708-019B960494DF}">
-                  <a14:hiddenLine xmlns:a14="http://schemas.microsoft.com/office/drawing/2010/main" xmlns="" w="9525">
+                  <a14:hiddenLine xmlns="" xmlns:a14="http://schemas.microsoft.com/office/drawing/2010/main" w="9525">
                     <a:solidFill>
                       <a:srgbClr val="000000"/>
                     </a:solidFill>
@@ -10439,7 +10439,7 @@
               </a:ln>
               <a:extLst>
                 <a:ext uri="{91240B29-F687-4f45-9708-019B960494DF}">
-                  <a14:hiddenLine xmlns:a14="http://schemas.microsoft.com/office/drawing/2010/main" xmlns="" w="9525">
+                  <a14:hiddenLine xmlns="" xmlns:a14="http://schemas.microsoft.com/office/drawing/2010/main" w="9525">
                     <a:solidFill>
                       <a:srgbClr val="000000"/>
                     </a:solidFill>
@@ -10523,7 +10523,7 @@
               </a:ln>
               <a:extLst>
                 <a:ext uri="{91240B29-F687-4f45-9708-019B960494DF}">
-                  <a14:hiddenLine xmlns:a14="http://schemas.microsoft.com/office/drawing/2010/main" xmlns="" w="9525">
+                  <a14:hiddenLine xmlns="" xmlns:a14="http://schemas.microsoft.com/office/drawing/2010/main" w="9525">
                     <a:solidFill>
                       <a:srgbClr val="000000"/>
                     </a:solidFill>
@@ -10585,7 +10585,7 @@
               </a:ln>
               <a:extLst>
                 <a:ext uri="{91240B29-F687-4f45-9708-019B960494DF}">
-                  <a14:hiddenLine xmlns:a14="http://schemas.microsoft.com/office/drawing/2010/main" xmlns="" w="9525">
+                  <a14:hiddenLine xmlns="" xmlns:a14="http://schemas.microsoft.com/office/drawing/2010/main" w="9525">
                     <a:solidFill>
                       <a:srgbClr val="000000"/>
                     </a:solidFill>
@@ -10647,7 +10647,7 @@
               </a:ln>
               <a:extLst>
                 <a:ext uri="{91240B29-F687-4f45-9708-019B960494DF}">
-                  <a14:hiddenLine xmlns:a14="http://schemas.microsoft.com/office/drawing/2010/main" xmlns="" w="9525">
+                  <a14:hiddenLine xmlns="" xmlns:a14="http://schemas.microsoft.com/office/drawing/2010/main" w="9525">
                     <a:solidFill>
                       <a:srgbClr val="000000"/>
                     </a:solidFill>
@@ -10737,7 +10737,7 @@
               </a:ln>
               <a:extLst>
                 <a:ext uri="{91240B29-F687-4f45-9708-019B960494DF}">
-                  <a14:hiddenLine xmlns:a14="http://schemas.microsoft.com/office/drawing/2010/main" xmlns="" w="9525">
+                  <a14:hiddenLine xmlns="" xmlns:a14="http://schemas.microsoft.com/office/drawing/2010/main" w="9525">
                     <a:solidFill>
                       <a:srgbClr val="000000"/>
                     </a:solidFill>
@@ -10771,7 +10771,7 @@
               </a:ln>
               <a:extLst>
                 <a:ext uri="{91240B29-F687-4f45-9708-019B960494DF}">
-                  <a14:hiddenLine xmlns:a14="http://schemas.microsoft.com/office/drawing/2010/main" xmlns="" w="9525">
+                  <a14:hiddenLine xmlns="" xmlns:a14="http://schemas.microsoft.com/office/drawing/2010/main" w="9525">
                     <a:solidFill>
                       <a:srgbClr val="000000"/>
                     </a:solidFill>
@@ -10836,7 +10836,7 @@
               </a:ln>
               <a:extLst>
                 <a:ext uri="{91240B29-F687-4f45-9708-019B960494DF}">
-                  <a14:hiddenLine xmlns:a14="http://schemas.microsoft.com/office/drawing/2010/main" xmlns="" w="9525">
+                  <a14:hiddenLine xmlns="" xmlns:a14="http://schemas.microsoft.com/office/drawing/2010/main" w="9525">
                     <a:solidFill>
                       <a:srgbClr val="000000"/>
                     </a:solidFill>
@@ -10926,7 +10926,7 @@
               </a:ln>
               <a:extLst>
                 <a:ext uri="{91240B29-F687-4f45-9708-019B960494DF}">
-                  <a14:hiddenLine xmlns:a14="http://schemas.microsoft.com/office/drawing/2010/main" xmlns="" w="9525">
+                  <a14:hiddenLine xmlns="" xmlns:a14="http://schemas.microsoft.com/office/drawing/2010/main" w="9525">
                     <a:solidFill>
                       <a:srgbClr val="000000"/>
                     </a:solidFill>
@@ -10988,7 +10988,7 @@
               </a:ln>
               <a:extLst>
                 <a:ext uri="{91240B29-F687-4f45-9708-019B960494DF}">
-                  <a14:hiddenLine xmlns:a14="http://schemas.microsoft.com/office/drawing/2010/main" xmlns="" w="9525">
+                  <a14:hiddenLine xmlns="" xmlns:a14="http://schemas.microsoft.com/office/drawing/2010/main" w="9525">
                     <a:solidFill>
                       <a:srgbClr val="000000"/>
                     </a:solidFill>
@@ -11078,7 +11078,7 @@
               </a:ln>
               <a:extLst>
                 <a:ext uri="{91240B29-F687-4f45-9708-019B960494DF}">
-                  <a14:hiddenLine xmlns:a14="http://schemas.microsoft.com/office/drawing/2010/main" xmlns="" w="9525">
+                  <a14:hiddenLine xmlns="" xmlns:a14="http://schemas.microsoft.com/office/drawing/2010/main" w="9525">
                     <a:solidFill>
                       <a:srgbClr val="000000"/>
                     </a:solidFill>
@@ -11143,7 +11143,7 @@
               </a:ln>
               <a:extLst>
                 <a:ext uri="{91240B29-F687-4f45-9708-019B960494DF}">
-                  <a14:hiddenLine xmlns:a14="http://schemas.microsoft.com/office/drawing/2010/main" xmlns="" w="9525">
+                  <a14:hiddenLine xmlns="" xmlns:a14="http://schemas.microsoft.com/office/drawing/2010/main" w="9525">
                     <a:solidFill>
                       <a:srgbClr val="000000"/>
                     </a:solidFill>
@@ -11205,7 +11205,7 @@
               </a:ln>
               <a:extLst>
                 <a:ext uri="{91240B29-F687-4f45-9708-019B960494DF}">
-                  <a14:hiddenLine xmlns:a14="http://schemas.microsoft.com/office/drawing/2010/main" xmlns="" w="9525">
+                  <a14:hiddenLine xmlns="" xmlns:a14="http://schemas.microsoft.com/office/drawing/2010/main" w="9525">
                     <a:solidFill>
                       <a:srgbClr val="000000"/>
                     </a:solidFill>
@@ -11295,7 +11295,7 @@
               </a:ln>
               <a:extLst>
                 <a:ext uri="{91240B29-F687-4f45-9708-019B960494DF}">
-                  <a14:hiddenLine xmlns:a14="http://schemas.microsoft.com/office/drawing/2010/main" xmlns="" w="9525">
+                  <a14:hiddenLine xmlns="" xmlns:a14="http://schemas.microsoft.com/office/drawing/2010/main" w="9525">
                     <a:solidFill>
                       <a:srgbClr val="000000"/>
                     </a:solidFill>
@@ -11385,7 +11385,7 @@
               </a:ln>
               <a:extLst>
                 <a:ext uri="{91240B29-F687-4f45-9708-019B960494DF}">
-                  <a14:hiddenLine xmlns:a14="http://schemas.microsoft.com/office/drawing/2010/main" xmlns="" w="9525">
+                  <a14:hiddenLine xmlns="" xmlns:a14="http://schemas.microsoft.com/office/drawing/2010/main" w="9525">
                     <a:solidFill>
                       <a:srgbClr val="000000"/>
                     </a:solidFill>
@@ -11450,7 +11450,7 @@
               </a:ln>
               <a:extLst>
                 <a:ext uri="{91240B29-F687-4f45-9708-019B960494DF}">
-                  <a14:hiddenLine xmlns:a14="http://schemas.microsoft.com/office/drawing/2010/main" xmlns="" w="9525">
+                  <a14:hiddenLine xmlns="" xmlns:a14="http://schemas.microsoft.com/office/drawing/2010/main" w="9525">
                     <a:solidFill>
                       <a:srgbClr val="000000"/>
                     </a:solidFill>
@@ -11570,7 +11570,7 @@
               </a:ln>
               <a:extLst>
                 <a:ext uri="{91240B29-F687-4f45-9708-019B960494DF}">
-                  <a14:hiddenLine xmlns:a14="http://schemas.microsoft.com/office/drawing/2010/main" xmlns="" w="9525">
+                  <a14:hiddenLine xmlns="" xmlns:a14="http://schemas.microsoft.com/office/drawing/2010/main" w="9525">
                     <a:solidFill>
                       <a:srgbClr val="000000"/>
                     </a:solidFill>
@@ -11651,7 +11651,7 @@
               </a:ln>
               <a:extLst>
                 <a:ext uri="{91240B29-F687-4f45-9708-019B960494DF}">
-                  <a14:hiddenLine xmlns:a14="http://schemas.microsoft.com/office/drawing/2010/main" xmlns="" w="9525">
+                  <a14:hiddenLine xmlns="" xmlns:a14="http://schemas.microsoft.com/office/drawing/2010/main" w="9525">
                     <a:solidFill>
                       <a:srgbClr val="000000"/>
                     </a:solidFill>
@@ -11766,7 +11766,7 @@
               </a:ln>
               <a:extLst>
                 <a:ext uri="{91240B29-F687-4f45-9708-019B960494DF}">
-                  <a14:hiddenLine xmlns:a14="http://schemas.microsoft.com/office/drawing/2010/main" xmlns="" w="9525">
+                  <a14:hiddenLine xmlns="" xmlns:a14="http://schemas.microsoft.com/office/drawing/2010/main" w="9525">
                     <a:solidFill>
                       <a:srgbClr val="000000"/>
                     </a:solidFill>
@@ -11856,7 +11856,7 @@
               </a:ln>
               <a:extLst>
                 <a:ext uri="{91240B29-F687-4f45-9708-019B960494DF}">
-                  <a14:hiddenLine xmlns:a14="http://schemas.microsoft.com/office/drawing/2010/main" xmlns="" w="9525">
+                  <a14:hiddenLine xmlns="" xmlns:a14="http://schemas.microsoft.com/office/drawing/2010/main" w="9525">
                     <a:solidFill>
                       <a:srgbClr val="000000"/>
                     </a:solidFill>
@@ -11921,7 +11921,7 @@
               </a:ln>
               <a:extLst>
                 <a:ext uri="{91240B29-F687-4f45-9708-019B960494DF}">
-                  <a14:hiddenLine xmlns:a14="http://schemas.microsoft.com/office/drawing/2010/main" xmlns="" w="9525">
+                  <a14:hiddenLine xmlns="" xmlns:a14="http://schemas.microsoft.com/office/drawing/2010/main" w="9525">
                     <a:solidFill>
                       <a:srgbClr val="000000"/>
                     </a:solidFill>
@@ -12011,7 +12011,7 @@
               </a:ln>
               <a:extLst>
                 <a:ext uri="{91240B29-F687-4f45-9708-019B960494DF}">
-                  <a14:hiddenLine xmlns:a14="http://schemas.microsoft.com/office/drawing/2010/main" xmlns="" w="9525">
+                  <a14:hiddenLine xmlns="" xmlns:a14="http://schemas.microsoft.com/office/drawing/2010/main" w="9525">
                     <a:solidFill>
                       <a:srgbClr val="000000"/>
                     </a:solidFill>
@@ -12079,7 +12079,7 @@
               </a:ln>
               <a:extLst>
                 <a:ext uri="{91240B29-F687-4f45-9708-019B960494DF}">
-                  <a14:hiddenLine xmlns:a14="http://schemas.microsoft.com/office/drawing/2010/main" xmlns="" w="9525">
+                  <a14:hiddenLine xmlns="" xmlns:a14="http://schemas.microsoft.com/office/drawing/2010/main" w="9525">
                     <a:solidFill>
                       <a:srgbClr val="000000"/>
                     </a:solidFill>
@@ -12169,7 +12169,7 @@
               </a:ln>
               <a:extLst>
                 <a:ext uri="{91240B29-F687-4f45-9708-019B960494DF}">
-                  <a14:hiddenLine xmlns:a14="http://schemas.microsoft.com/office/drawing/2010/main" xmlns="" w="9525">
+                  <a14:hiddenLine xmlns="" xmlns:a14="http://schemas.microsoft.com/office/drawing/2010/main" w="9525">
                     <a:solidFill>
                       <a:srgbClr val="000000"/>
                     </a:solidFill>
@@ -12237,7 +12237,7 @@
               </a:ln>
               <a:extLst>
                 <a:ext uri="{91240B29-F687-4f45-9708-019B960494DF}">
-                  <a14:hiddenLine xmlns:a14="http://schemas.microsoft.com/office/drawing/2010/main" xmlns="" w="9525">
+                  <a14:hiddenLine xmlns="" xmlns:a14="http://schemas.microsoft.com/office/drawing/2010/main" w="9525">
                     <a:solidFill>
                       <a:srgbClr val="000000"/>
                     </a:solidFill>
@@ -12327,7 +12327,7 @@
               </a:ln>
               <a:extLst>
                 <a:ext uri="{91240B29-F687-4f45-9708-019B960494DF}">
-                  <a14:hiddenLine xmlns:a14="http://schemas.microsoft.com/office/drawing/2010/main" xmlns="" w="9525">
+                  <a14:hiddenLine xmlns="" xmlns:a14="http://schemas.microsoft.com/office/drawing/2010/main" w="9525">
                     <a:solidFill>
                       <a:srgbClr val="000000"/>
                     </a:solidFill>
@@ -12361,7 +12361,7 @@
               </a:ln>
               <a:extLst>
                 <a:ext uri="{91240B29-F687-4f45-9708-019B960494DF}">
-                  <a14:hiddenLine xmlns:a14="http://schemas.microsoft.com/office/drawing/2010/main" xmlns="" w="9525">
+                  <a14:hiddenLine xmlns="" xmlns:a14="http://schemas.microsoft.com/office/drawing/2010/main" w="9525">
                     <a:solidFill>
                       <a:srgbClr val="000000"/>
                     </a:solidFill>
@@ -15041,8 +15041,8 @@
           </a:p>
         </p:txBody>
       </p:sp>
-      <mc:AlternateContent xmlns:mc="http://schemas.openxmlformats.org/markup-compatibility/2006" xmlns:a14="http://schemas.microsoft.com/office/drawing/2010/main">
-        <mc:Choice Requires="a14">
+      <mc:AlternateContent xmlns:mc="http://schemas.openxmlformats.org/markup-compatibility/2006">
+        <mc:Choice xmlns:a14="http://schemas.microsoft.com/office/drawing/2010/main" Requires="a14">
           <p:sp>
             <p:nvSpPr>
               <p:cNvPr id="8" name="Content Placeholder 2">
@@ -15254,7 +15254,7 @@
                 </a:r>
                 <a:r>
                   <a:rPr lang="en-US" dirty="0"/>
-                  <a:t>: Every natural number divisible by 9. So grab an arbitrary one </a:t>
+                  <a:t>: if a natural number is divisible by 9. So grab an arbitrary one </a:t>
                 </a:r>
                 <a14:m>
                   <m:oMath xmlns:m="http://schemas.openxmlformats.org/officeDocument/2006/math">
@@ -15421,7 +15421,7 @@
             </p:txBody>
           </p:sp>
         </mc:Choice>
-        <mc:Fallback xmlns="">
+        <mc:Fallback>
           <p:sp>
             <p:nvSpPr>
               <p:cNvPr id="8" name="Content Placeholder 2">
@@ -15447,7 +15447,7 @@
               <a:blipFill>
                 <a:blip r:embed="rId2"/>
                 <a:stretch>
-                  <a:fillRect l="-1083" t="-316" r="-1264"/>
+                  <a:fillRect l="-1083" t="-316" r="-1444"/>
                 </a:stretch>
               </a:blipFill>
             </p:spPr>
@@ -20773,8 +20773,8 @@
           </a:p>
         </p:txBody>
       </p:sp>
-      <mc:AlternateContent xmlns:mc="http://schemas.openxmlformats.org/markup-compatibility/2006" xmlns:a14="http://schemas.microsoft.com/office/drawing/2010/main">
-        <mc:Choice Requires="a14">
+      <mc:AlternateContent xmlns:mc="http://schemas.openxmlformats.org/markup-compatibility/2006">
+        <mc:Choice xmlns:a14="http://schemas.microsoft.com/office/drawing/2010/main" Requires="a14">
           <p:sp>
             <p:nvSpPr>
               <p:cNvPr id="5" name="Content Placeholder 2">
@@ -21116,6 +21116,48 @@
                           </m:ctrlPr>
                         </m:dPr>
                         <m:e>
+                          <m:r>
+                            <a:rPr lang="en-US" b="0" i="1" smtClean="0">
+                              <a:latin typeface="Cambria Math" panose="02040503050406030204" pitchFamily="18" charset="0"/>
+                            </a:rPr>
+                            <m:t>{</m:t>
+                          </m:r>
+                          <m:r>
+                            <a:rPr lang="en-US" b="0" i="1" smtClean="0">
+                              <a:latin typeface="Cambria Math" panose="02040503050406030204" pitchFamily="18" charset="0"/>
+                            </a:rPr>
+                            <m:t>𝑛</m:t>
+                          </m:r>
+                          <m:r>
+                            <a:rPr lang="en-US" b="0" i="1" smtClean="0">
+                              <a:latin typeface="Cambria Math" panose="02040503050406030204" pitchFamily="18" charset="0"/>
+                            </a:rPr>
+                            <m:t>−1, 0}</m:t>
+                          </m:r>
+                        </m:e>
+                      </m:d>
+                    </m:oMath>
+                    <m:oMath xmlns:m="http://schemas.openxmlformats.org/officeDocument/2006/math">
+                      <m:r>
+                        <m:rPr>
+                          <m:aln/>
+                        </m:rPr>
+                        <a:rPr lang="en-US" b="0" i="1" smtClean="0">
+                          <a:latin typeface="Cambria Math" panose="02040503050406030204" pitchFamily="18" charset="0"/>
+                        </a:rPr>
+                        <m:t>∪</m:t>
+                      </m:r>
+                      <m:d>
+                        <m:dPr>
+                          <m:begChr m:val="{"/>
+                          <m:endChr m:val="|"/>
+                          <m:ctrlPr>
+                            <a:rPr lang="en-US" b="0" i="1" smtClean="0">
+                              <a:latin typeface="Cambria Math" panose="02040503050406030204" pitchFamily="18" charset="0"/>
+                            </a:rPr>
+                          </m:ctrlPr>
+                        </m:dPr>
+                        <m:e>
                           <m:d>
                             <m:dPr>
                               <m:begChr m:val="{"/>
@@ -21131,95 +21173,60 @@
                                 <a:rPr lang="en-US" b="0" i="1" smtClean="0">
                                   <a:latin typeface="Cambria Math" panose="02040503050406030204" pitchFamily="18" charset="0"/>
                                 </a:rPr>
-                                <m:t>𝑛</m:t>
+                                <m:t>𝑖</m:t>
                               </m:r>
                               <m:r>
                                 <a:rPr lang="en-US" b="0" i="1" smtClean="0">
                                   <a:latin typeface="Cambria Math" panose="02040503050406030204" pitchFamily="18" charset="0"/>
                                 </a:rPr>
-                                <m:t>−1</m:t>
+                                <m:t>, </m:t>
                               </m:r>
+                              <m:r>
+                                <a:rPr lang="en-US" b="0" i="1" smtClean="0">
+                                  <a:latin typeface="Cambria Math" panose="02040503050406030204" pitchFamily="18" charset="0"/>
+                                </a:rPr>
+                                <m:t>𝑖</m:t>
+                              </m:r>
+                              <m:r>
+                                <a:rPr lang="en-US" b="0" i="1" smtClean="0">
+                                  <a:latin typeface="Cambria Math" panose="02040503050406030204" pitchFamily="18" charset="0"/>
+                                </a:rPr>
+                                <m:t>+</m:t>
+                              </m:r>
+                              <m:f>
+                                <m:fPr>
+                                  <m:ctrlPr>
+                                    <a:rPr lang="en-US" b="0" i="1" smtClean="0">
+                                      <a:latin typeface="Cambria Math" panose="02040503050406030204" pitchFamily="18" charset="0"/>
+                                    </a:rPr>
+                                  </m:ctrlPr>
+                                </m:fPr>
+                                <m:num>
+                                  <m:r>
+                                    <a:rPr lang="en-US" b="0" i="1" smtClean="0">
+                                      <a:latin typeface="Cambria Math" panose="02040503050406030204" pitchFamily="18" charset="0"/>
+                                    </a:rPr>
+                                    <m:t>𝑛</m:t>
+                                  </m:r>
+                                </m:num>
+                                <m:den>
+                                  <m:r>
+                                    <a:rPr lang="en-US" b="0" i="1" smtClean="0">
+                                      <a:latin typeface="Cambria Math" panose="02040503050406030204" pitchFamily="18" charset="0"/>
+                                    </a:rPr>
+                                    <m:t>2</m:t>
+                                  </m:r>
+                                </m:den>
+                              </m:f>
                             </m:e>
                           </m:d>
-                          <m:r>
-                            <a:rPr lang="en-US" b="0" i="1" smtClean="0">
-                              <a:latin typeface="Cambria Math" panose="02040503050406030204" pitchFamily="18" charset="0"/>
-                            </a:rPr>
-                            <m:t>, 0</m:t>
-                          </m:r>
                         </m:e>
                       </m:d>
-                    </m:oMath>
-                    <m:oMath xmlns:m="http://schemas.openxmlformats.org/officeDocument/2006/math">
-                      <m:r>
-                        <m:rPr>
-                          <m:aln/>
-                        </m:rPr>
-                        <a:rPr lang="en-US" b="0" i="1" smtClean="0">
-                          <a:latin typeface="Cambria Math" panose="02040503050406030204" pitchFamily="18" charset="0"/>
-                        </a:rPr>
-                        <m:t>∪</m:t>
-                      </m:r>
                       <m:r>
                         <a:rPr lang="en-US" b="0" i="1" smtClean="0">
                           <a:latin typeface="Cambria Math" panose="02040503050406030204" pitchFamily="18" charset="0"/>
                         </a:rPr>
-                        <m:t>{{</m:t>
-                      </m:r>
-                      <m:r>
-                        <a:rPr lang="en-US" b="0" i="1" smtClean="0">
-                          <a:latin typeface="Cambria Math" panose="02040503050406030204" pitchFamily="18" charset="0"/>
-                        </a:rPr>
-                        <m:t>𝑖</m:t>
-                      </m:r>
-                      <m:r>
-                        <a:rPr lang="en-US" b="0" i="1" smtClean="0">
-                          <a:latin typeface="Cambria Math" panose="02040503050406030204" pitchFamily="18" charset="0"/>
-                        </a:rPr>
-                        <m:t>, </m:t>
-                      </m:r>
-                      <m:r>
-                        <a:rPr lang="en-US" b="0" i="1" smtClean="0">
-                          <a:latin typeface="Cambria Math" panose="02040503050406030204" pitchFamily="18" charset="0"/>
-                        </a:rPr>
-                        <m:t>𝑖</m:t>
-                      </m:r>
-                      <m:r>
-                        <a:rPr lang="en-US" b="0" i="1" smtClean="0">
-                          <a:latin typeface="Cambria Math" panose="02040503050406030204" pitchFamily="18" charset="0"/>
-                        </a:rPr>
-                        <m:t>+</m:t>
-                      </m:r>
-                      <m:f>
-                        <m:fPr>
-                          <m:ctrlPr>
-                            <a:rPr lang="en-US" b="0" i="1" smtClean="0">
-                              <a:latin typeface="Cambria Math" panose="02040503050406030204" pitchFamily="18" charset="0"/>
-                            </a:rPr>
-                          </m:ctrlPr>
-                        </m:fPr>
-                        <m:num>
-                          <m:r>
-                            <a:rPr lang="en-US" b="0" i="1" smtClean="0">
-                              <a:latin typeface="Cambria Math" panose="02040503050406030204" pitchFamily="18" charset="0"/>
-                            </a:rPr>
-                            <m:t>𝑛</m:t>
-                          </m:r>
-                        </m:num>
-                        <m:den>
-                          <m:r>
-                            <a:rPr lang="en-US" b="0" i="1" smtClean="0">
-                              <a:latin typeface="Cambria Math" panose="02040503050406030204" pitchFamily="18" charset="0"/>
-                            </a:rPr>
-                            <m:t>2</m:t>
-                          </m:r>
-                        </m:den>
-                      </m:f>
-                      <m:r>
-                        <a:rPr lang="en-US" b="0" i="1" smtClean="0">
-                          <a:latin typeface="Cambria Math" panose="02040503050406030204" pitchFamily="18" charset="0"/>
-                        </a:rPr>
-                        <m:t>}|0≤</m:t>
+                        <m:t>0≤</m:t>
                       </m:r>
                       <m:r>
                         <a:rPr lang="en-US" b="0" i="1" smtClean="0">
@@ -21272,7 +21279,7 @@
             </p:txBody>
           </p:sp>
         </mc:Choice>
-        <mc:Fallback xmlns="">
+        <mc:Fallback>
           <p:sp>
             <p:nvSpPr>
               <p:cNvPr id="5" name="Content Placeholder 2">
@@ -22023,7 +22030,7 @@
         </p:nvSpPr>
         <p:spPr>
           <a:xfrm>
-            <a:off x="791884" y="3944510"/>
+            <a:off x="538390" y="3944510"/>
             <a:ext cx="1518572" cy="1034563"/>
           </a:xfrm>
         </p:spPr>
@@ -22258,8 +22265,8 @@
           </a:p>
         </p:txBody>
       </p:sp>
-      <mc:AlternateContent xmlns:mc="http://schemas.openxmlformats.org/markup-compatibility/2006" xmlns:a14="http://schemas.microsoft.com/office/drawing/2010/main">
-        <mc:Choice Requires="a14">
+      <mc:AlternateContent xmlns:mc="http://schemas.openxmlformats.org/markup-compatibility/2006">
+        <mc:Choice xmlns:a14="http://schemas.microsoft.com/office/drawing/2010/main" Requires="a14">
           <p:sp>
             <p:nvSpPr>
               <p:cNvPr id="6" name="Content Placeholder 2">
@@ -22276,7 +22283,7 @@
             </p:nvSpPr>
             <p:spPr>
               <a:xfrm>
-                <a:off x="2379905" y="2709946"/>
+                <a:off x="2126411" y="2709946"/>
                 <a:ext cx="2601332" cy="590309"/>
               </a:xfrm>
               <a:prstGeom prst="rect">
@@ -22523,7 +22530,7 @@
             </p:txBody>
           </p:sp>
         </mc:Choice>
-        <mc:Fallback xmlns="">
+        <mc:Fallback>
           <p:sp>
             <p:nvSpPr>
               <p:cNvPr id="6" name="Content Placeholder 2">
@@ -22540,7 +22547,7 @@
             </p:nvSpPr>
             <p:spPr>
               <a:xfrm>
-                <a:off x="2379905" y="2709946"/>
+                <a:off x="2126411" y="2709946"/>
                 <a:ext cx="2601332" cy="590309"/>
               </a:xfrm>
               <a:prstGeom prst="rect">
@@ -22549,7 +22556,7 @@
               <a:blipFill>
                 <a:blip r:embed="rId2"/>
                 <a:stretch>
-                  <a:fillRect l="-2913" b="-6250"/>
+                  <a:fillRect l="-3398" b="-6250"/>
                 </a:stretch>
               </a:blipFill>
             </p:spPr>
@@ -22584,7 +22591,7 @@
         </p:nvCxnSpPr>
         <p:spPr>
           <a:xfrm>
-            <a:off x="2042291" y="4704492"/>
+            <a:off x="1788797" y="4704492"/>
             <a:ext cx="492565" cy="274581"/>
           </a:xfrm>
           <a:prstGeom prst="line">
@@ -22629,7 +22636,7 @@
         </p:nvSpPr>
         <p:spPr>
           <a:xfrm>
-            <a:off x="4170156" y="2094328"/>
+            <a:off x="3916662" y="2094328"/>
             <a:ext cx="3469135" cy="463677"/>
           </a:xfrm>
           <a:prstGeom prst="rect">
@@ -22842,7 +22849,7 @@
         </p:nvSpPr>
         <p:spPr>
           <a:xfrm>
-            <a:off x="2688300" y="3580495"/>
+            <a:off x="2434806" y="3580495"/>
             <a:ext cx="2034172" cy="2797156"/>
           </a:xfrm>
           <a:prstGeom prst="rect">
@@ -23122,7 +23129,7 @@
         </p:nvSpPr>
         <p:spPr>
           <a:xfrm>
-            <a:off x="5360911" y="4187578"/>
+            <a:off x="5107417" y="4187578"/>
             <a:ext cx="1518572" cy="1034563"/>
           </a:xfrm>
           <a:prstGeom prst="rect">
@@ -23334,7 +23341,7 @@
         </p:nvCxnSpPr>
         <p:spPr>
           <a:xfrm>
-            <a:off x="6611318" y="4947560"/>
+            <a:off x="6357824" y="4947560"/>
             <a:ext cx="492565" cy="274581"/>
           </a:xfrm>
           <a:prstGeom prst="line">
@@ -23379,7 +23386,7 @@
         </p:nvSpPr>
         <p:spPr>
           <a:xfrm>
-            <a:off x="7257326" y="3823563"/>
+            <a:off x="7003832" y="3823563"/>
             <a:ext cx="4317357" cy="2021652"/>
           </a:xfrm>
           <a:prstGeom prst="rect">
@@ -23618,7 +23625,7 @@
         </p:nvCxnSpPr>
         <p:spPr>
           <a:xfrm>
-            <a:off x="10150997" y="3136739"/>
+            <a:off x="9897503" y="3136739"/>
             <a:ext cx="208345" cy="590309"/>
           </a:xfrm>
           <a:prstGeom prst="line">
@@ -23663,7 +23670,7 @@
         </p:nvSpPr>
         <p:spPr>
           <a:xfrm>
-            <a:off x="8840769" y="2167796"/>
+            <a:off x="8587275" y="2167796"/>
             <a:ext cx="1738491" cy="1034563"/>
           </a:xfrm>
           <a:prstGeom prst="rect">
@@ -28358,8 +28365,8 @@
           </a:p>
         </p:txBody>
       </p:sp>
-      <mc:AlternateContent xmlns:mc="http://schemas.openxmlformats.org/markup-compatibility/2006" xmlns:a14="http://schemas.microsoft.com/office/drawing/2010/main">
-        <mc:Choice Requires="a14">
+      <mc:AlternateContent xmlns:mc="http://schemas.openxmlformats.org/markup-compatibility/2006">
+        <mc:Choice xmlns:a14="http://schemas.microsoft.com/office/drawing/2010/main" Requires="a14">
           <p:sp>
             <p:nvSpPr>
               <p:cNvPr id="3" name="Content Placeholder 2">
@@ -28627,13 +28634,16 @@
                     </m:f>
                   </m:oMath>
                 </a14:m>
-                <a:endParaRPr lang="en-US" dirty="0">
-                  <a:solidFill>
-                    <a:schemeClr val="tx1">
-                      <a:lumMod val="95000"/>
-                    </a:schemeClr>
-                  </a:solidFill>
-                </a:endParaRPr>
+                <a:r>
+                  <a:rPr lang="en-US" dirty="0">
+                    <a:solidFill>
+                      <a:schemeClr val="tx1">
+                        <a:lumMod val="95000"/>
+                      </a:schemeClr>
+                    </a:solidFill>
+                  </a:rPr>
+                  <a:t> (note that m, n cannot be 0)</a:t>
+                </a:r>
               </a:p>
               <a:p>
                 <a:pPr marL="0" indent="0">
@@ -29526,7 +29536,7 @@
             </p:txBody>
           </p:sp>
         </mc:Choice>
-        <mc:Fallback xmlns="">
+        <mc:Fallback>
           <p:sp>
             <p:nvSpPr>
               <p:cNvPr id="3" name="Content Placeholder 2">

</xml_diff>